<commit_message>
feat : update new test data
</commit_message>
<xml_diff>
--- a/computerTestRelative/上機考一.pptx
+++ b/computerTestRelative/上機考一.pptx
@@ -202,7 +202,7 @@
           <a:p>
             <a:fld id="{F9794199-4AFB-41F6-A97A-6511EDF5DC2A}" type="datetimeFigureOut">
               <a:rPr lang="zh-TW" altLang="en-US" smtClean="0"/>
-              <a:t>2021/12/23</a:t>
+              <a:t>2022/1/8</a:t>
             </a:fld>
             <a:endParaRPr lang="zh-TW" altLang="en-US"/>
           </a:p>
@@ -684,7 +684,7 @@
           <a:p>
             <a:fld id="{21452ABF-2A1B-4187-8705-90FDDFE9EB7A}" type="datetime1">
               <a:rPr lang="zh-TW" altLang="en-US" smtClean="0"/>
-              <a:t>2021/12/23</a:t>
+              <a:t>2022/1/8</a:t>
             </a:fld>
             <a:endParaRPr lang="zh-TW" altLang="en-US"/>
           </a:p>
@@ -857,7 +857,7 @@
           <a:p>
             <a:fld id="{AD4AF52C-583D-4A19-A618-5E97F54B0B7B}" type="datetime1">
               <a:rPr lang="zh-TW" altLang="en-US" smtClean="0"/>
-              <a:t>2021/12/23</a:t>
+              <a:t>2022/1/8</a:t>
             </a:fld>
             <a:endParaRPr lang="zh-TW" altLang="en-US"/>
           </a:p>
@@ -1040,7 +1040,7 @@
           <a:p>
             <a:fld id="{9EFF8C62-A0D5-46CB-A109-A29A527E2349}" type="datetime1">
               <a:rPr lang="zh-TW" altLang="en-US" smtClean="0"/>
-              <a:t>2021/12/23</a:t>
+              <a:t>2022/1/8</a:t>
             </a:fld>
             <a:endParaRPr lang="zh-TW" altLang="en-US"/>
           </a:p>
@@ -1213,7 +1213,7 @@
           <a:p>
             <a:fld id="{DC39FD49-054F-41F8-93E2-6E376BD3A2FD}" type="datetime1">
               <a:rPr lang="zh-TW" altLang="en-US" smtClean="0"/>
-              <a:t>2021/12/23</a:t>
+              <a:t>2022/1/8</a:t>
             </a:fld>
             <a:endParaRPr lang="zh-TW" altLang="en-US"/>
           </a:p>
@@ -1470,7 +1470,7 @@
           <a:p>
             <a:fld id="{9E33C1B0-7A38-43B3-8D5C-9A7989DBDA9D}" type="datetime1">
               <a:rPr lang="zh-TW" altLang="en-US" smtClean="0"/>
-              <a:t>2021/12/23</a:t>
+              <a:t>2022/1/8</a:t>
             </a:fld>
             <a:endParaRPr lang="zh-TW" altLang="en-US"/>
           </a:p>
@@ -1705,7 +1705,7 @@
           <a:p>
             <a:fld id="{3AD3CB81-9857-4EA9-B145-7B248FBFF9EE}" type="datetime1">
               <a:rPr lang="zh-TW" altLang="en-US" smtClean="0"/>
-              <a:t>2021/12/23</a:t>
+              <a:t>2022/1/8</a:t>
             </a:fld>
             <a:endParaRPr lang="zh-TW" altLang="en-US"/>
           </a:p>
@@ -2075,7 +2075,7 @@
           <a:p>
             <a:fld id="{5A6BFD47-A379-458E-81CF-C1AA0E322AB2}" type="datetime1">
               <a:rPr lang="zh-TW" altLang="en-US" smtClean="0"/>
-              <a:t>2021/12/23</a:t>
+              <a:t>2022/1/8</a:t>
             </a:fld>
             <a:endParaRPr lang="zh-TW" altLang="en-US"/>
           </a:p>
@@ -2196,7 +2196,7 @@
           <a:p>
             <a:fld id="{644788FD-7144-40B1-ABC3-8229746527C8}" type="datetime1">
               <a:rPr lang="zh-TW" altLang="en-US" smtClean="0"/>
-              <a:t>2021/12/23</a:t>
+              <a:t>2022/1/8</a:t>
             </a:fld>
             <a:endParaRPr lang="zh-TW" altLang="en-US"/>
           </a:p>
@@ -2294,7 +2294,7 @@
           <a:p>
             <a:fld id="{010D7CBE-9E15-465E-9065-C699719C4ED7}" type="datetime1">
               <a:rPr lang="zh-TW" altLang="en-US" smtClean="0"/>
-              <a:t>2021/12/23</a:t>
+              <a:t>2022/1/8</a:t>
             </a:fld>
             <a:endParaRPr lang="zh-TW" altLang="en-US"/>
           </a:p>
@@ -2574,7 +2574,7 @@
           <a:p>
             <a:fld id="{D80455BC-1A5D-4468-9AB1-04A273E98F6C}" type="datetime1">
               <a:rPr lang="zh-TW" altLang="en-US" smtClean="0"/>
-              <a:t>2021/12/23</a:t>
+              <a:t>2022/1/8</a:t>
             </a:fld>
             <a:endParaRPr lang="zh-TW" altLang="en-US"/>
           </a:p>
@@ -2834,7 +2834,7 @@
           <a:p>
             <a:fld id="{1DA2E568-51E0-42F6-A67D-01161FD6AF00}" type="datetime1">
               <a:rPr lang="zh-TW" altLang="en-US" smtClean="0"/>
-              <a:t>2021/12/23</a:t>
+              <a:t>2022/1/8</a:t>
             </a:fld>
             <a:endParaRPr lang="zh-TW" altLang="en-US"/>
           </a:p>
@@ -3050,7 +3050,7 @@
           <a:p>
             <a:fld id="{2BABEEC5-22CD-4368-AC81-0C25697F3122}" type="datetime1">
               <a:rPr lang="zh-TW" altLang="en-US" smtClean="0"/>
-              <a:t>2021/12/23</a:t>
+              <a:t>2022/1/8</a:t>
             </a:fld>
             <a:endParaRPr lang="zh-TW" altLang="en-US"/>
           </a:p>
@@ -3485,6 +3485,20 @@
           <a:bodyPr/>
           <a:lstStyle/>
           <a:p>
+            <a:r>
+              <a:rPr lang="en-US" altLang="zh-TW" b="1" dirty="0">
+                <a:latin typeface="Times New Roman" panose="02020603050405020304" pitchFamily="18" charset="0"/>
+                <a:cs typeface="Times New Roman" panose="02020603050405020304" pitchFamily="18" charset="0"/>
+              </a:rPr>
+              <a:t>1.</a:t>
+            </a:r>
+            <a:r>
+              <a:rPr lang="zh-TW" altLang="en-US" b="1" dirty="0">
+                <a:latin typeface="Times New Roman" panose="02020603050405020304" pitchFamily="18" charset="0"/>
+                <a:cs typeface="Times New Roman" panose="02020603050405020304" pitchFamily="18" charset="0"/>
+              </a:rPr>
+              <a:t> </a:t>
+            </a:r>
             <a:r>
               <a:rPr lang="en-US" altLang="zh-TW" b="1" dirty="0">
                 <a:latin typeface="Times New Roman" panose="02020603050405020304" pitchFamily="18" charset="0"/>
@@ -4616,6 +4630,20 @@
                 <a:latin typeface="Times New Roman" panose="02020603050405020304" pitchFamily="18" charset="0"/>
                 <a:cs typeface="Times New Roman" panose="02020603050405020304" pitchFamily="18" charset="0"/>
               </a:rPr>
+              <a:t>2.</a:t>
+            </a:r>
+            <a:r>
+              <a:rPr lang="zh-TW" altLang="en-US" b="1" dirty="0">
+                <a:latin typeface="Times New Roman" panose="02020603050405020304" pitchFamily="18" charset="0"/>
+                <a:cs typeface="Times New Roman" panose="02020603050405020304" pitchFamily="18" charset="0"/>
+              </a:rPr>
+              <a:t> </a:t>
+            </a:r>
+            <a:r>
+              <a:rPr lang="en-US" altLang="zh-TW" b="1" dirty="0">
+                <a:latin typeface="Times New Roman" panose="02020603050405020304" pitchFamily="18" charset="0"/>
+                <a:cs typeface="Times New Roman" panose="02020603050405020304" pitchFamily="18" charset="0"/>
+              </a:rPr>
               <a:t>Preorder expression (30)</a:t>
             </a:r>
             <a:endParaRPr lang="zh-TW" altLang="en-US" dirty="0"/>
@@ -5819,6 +5847,20 @@
           <a:bodyPr/>
           <a:lstStyle/>
           <a:p>
+            <a:r>
+              <a:rPr lang="en-US" altLang="zh-TW" b="1" dirty="0">
+                <a:latin typeface="Times New Roman" panose="02020603050405020304" pitchFamily="18" charset="0"/>
+                <a:cs typeface="Times New Roman" panose="02020603050405020304" pitchFamily="18" charset="0"/>
+              </a:rPr>
+              <a:t>3.</a:t>
+            </a:r>
+            <a:r>
+              <a:rPr lang="zh-TW" altLang="en-US" b="1" dirty="0">
+                <a:latin typeface="Times New Roman" panose="02020603050405020304" pitchFamily="18" charset="0"/>
+                <a:cs typeface="Times New Roman" panose="02020603050405020304" pitchFamily="18" charset="0"/>
+              </a:rPr>
+              <a:t> </a:t>
+            </a:r>
             <a:r>
               <a:rPr lang="en-US" altLang="zh-TW" b="1" dirty="0">
                 <a:latin typeface="Times New Roman" panose="02020603050405020304" pitchFamily="18" charset="0"/>

</xml_diff>